<commit_message>
AOHW 2024 - 329
</commit_message>
<xml_diff>
--- a/ASH_OHW_PWP.pptx
+++ b/ASH_OHW_PWP.pptx
@@ -302,7 +302,7 @@
           <a:p>
             <a:fld id="{2317D56F-68D5-48EE-A1D7-43390255C654}" type="datetimeFigureOut">
               <a:rPr lang="it-IT" smtClean="0"/>
-              <a:t>30/06/2024</a:t>
+              <a:t>01/07/2024</a:t>
             </a:fld>
             <a:endParaRPr lang="it-IT"/>
           </a:p>
@@ -480,7 +480,7 @@
           <a:p>
             <a:fld id="{FBA6340F-5DA4-4D52-9A6F-654C93F4A91D}" type="datetimeFigureOut">
               <a:rPr lang="it-IT" smtClean="0"/>
-              <a:t>30/06/2024</a:t>
+              <a:t>01/07/2024</a:t>
             </a:fld>
             <a:endParaRPr lang="it-IT"/>
           </a:p>
@@ -1011,7 +1011,7 @@
           <a:p>
             <a:fld id="{70BC2B12-EDCD-4D37-851B-23F0C10A5119}" type="datetime1">
               <a:rPr lang="en-US" smtClean="0"/>
-              <a:t>6/30/2024</a:t>
+              <a:t>7/1/2024</a:t>
             </a:fld>
             <a:endParaRPr lang="en-US"/>
           </a:p>
@@ -1175,7 +1175,7 @@
           <a:p>
             <a:fld id="{A27744FE-D987-494F-8D34-97C02BF6FDEC}" type="datetime1">
               <a:rPr lang="en-US" smtClean="0"/>
-              <a:t>6/30/2024</a:t>
+              <a:t>7/1/2024</a:t>
             </a:fld>
             <a:endParaRPr lang="en-US"/>
           </a:p>
@@ -1349,7 +1349,7 @@
           <a:p>
             <a:fld id="{FF4590CA-2F2C-4597-938C-7A1939856FAD}" type="datetime1">
               <a:rPr lang="en-US" smtClean="0"/>
-              <a:t>6/30/2024</a:t>
+              <a:t>7/1/2024</a:t>
             </a:fld>
             <a:endParaRPr lang="en-US"/>
           </a:p>
@@ -1513,7 +1513,7 @@
           <a:p>
             <a:fld id="{A8A750D4-FD37-45AF-8BBD-45DD464B333B}" type="datetime1">
               <a:rPr lang="en-US" smtClean="0"/>
-              <a:t>6/30/2024</a:t>
+              <a:t>7/1/2024</a:t>
             </a:fld>
             <a:endParaRPr lang="en-US"/>
           </a:p>
@@ -1754,7 +1754,7 @@
           <a:p>
             <a:fld id="{28DBFCB0-80EB-4EB2-89BB-50EA06718955}" type="datetime1">
               <a:rPr lang="en-US" smtClean="0"/>
-              <a:t>6/30/2024</a:t>
+              <a:t>7/1/2024</a:t>
             </a:fld>
             <a:endParaRPr lang="en-US"/>
           </a:p>
@@ -2035,7 +2035,7 @@
           <a:p>
             <a:fld id="{F98FFE12-D919-4C7F-AB5F-34CBB1D81E08}" type="datetime1">
               <a:rPr lang="en-US" smtClean="0"/>
-              <a:t>6/30/2024</a:t>
+              <a:t>7/1/2024</a:t>
             </a:fld>
             <a:endParaRPr lang="en-US"/>
           </a:p>
@@ -2450,7 +2450,7 @@
           <a:p>
             <a:fld id="{3849772C-CB7F-4F29-84BC-C68CC2FF835D}" type="datetime1">
               <a:rPr lang="en-US" smtClean="0"/>
-              <a:t>6/30/2024</a:t>
+              <a:t>7/1/2024</a:t>
             </a:fld>
             <a:endParaRPr lang="en-US"/>
           </a:p>
@@ -2563,7 +2563,7 @@
           <a:p>
             <a:fld id="{4E871A0A-9953-40E0-95C7-A65BFDDCF43F}" type="datetime1">
               <a:rPr lang="en-US" smtClean="0"/>
-              <a:t>6/30/2024</a:t>
+              <a:t>7/1/2024</a:t>
             </a:fld>
             <a:endParaRPr lang="en-US"/>
           </a:p>
@@ -2654,7 +2654,7 @@
           <a:p>
             <a:fld id="{C233E886-7878-4132-ABBC-C518ADA8D23B}" type="datetime1">
               <a:rPr lang="en-US" smtClean="0"/>
-              <a:t>6/30/2024</a:t>
+              <a:t>7/1/2024</a:t>
             </a:fld>
             <a:endParaRPr lang="en-US"/>
           </a:p>
@@ -2925,7 +2925,7 @@
           <a:p>
             <a:fld id="{A6E3D8D5-C839-449F-8373-81545C8C0591}" type="datetime1">
               <a:rPr lang="en-US" smtClean="0"/>
-              <a:t>6/30/2024</a:t>
+              <a:t>7/1/2024</a:t>
             </a:fld>
             <a:endParaRPr lang="en-US"/>
           </a:p>
@@ -3173,7 +3173,7 @@
           <a:p>
             <a:fld id="{82D2F3A7-5B27-4A8D-B58C-D3C493214B0D}" type="datetime1">
               <a:rPr lang="en-US" smtClean="0"/>
-              <a:t>6/30/2024</a:t>
+              <a:t>7/1/2024</a:t>
             </a:fld>
             <a:endParaRPr lang="en-US"/>
           </a:p>
@@ -3380,7 +3380,7 @@
           <a:p>
             <a:fld id="{1FB1430C-1847-41B4-B649-EC15C7726FC9}" type="datetime1">
               <a:rPr lang="en-US" smtClean="0"/>
-              <a:t>6/30/2024</a:t>
+              <a:t>7/1/2024</a:t>
             </a:fld>
             <a:endParaRPr lang="en-US"/>
           </a:p>
@@ -4036,8 +4036,8 @@
         </p:nvSpPr>
         <p:spPr>
           <a:xfrm>
-            <a:off x="6114089" y="9134379"/>
-            <a:ext cx="6059821" cy="870046"/>
+            <a:off x="6114088" y="8626272"/>
+            <a:ext cx="6059821" cy="1318759"/>
           </a:xfrm>
           <a:prstGeom prst="rect">
             <a:avLst/>
@@ -4048,6 +4048,23 @@
             <a:spAutoFit/>
           </a:bodyPr>
           <a:lstStyle/>
+          <a:p>
+            <a:pPr algn="ctr">
+              <a:lnSpc>
+                <a:spcPts val="3499"/>
+              </a:lnSpc>
+            </a:pPr>
+            <a:r>
+              <a:rPr lang="en-US" sz="2499" spc="124" dirty="0">
+                <a:solidFill>
+                  <a:srgbClr val="2E2E2E"/>
+                </a:solidFill>
+                <a:latin typeface="Arial Black" panose="020B0A04020102020204" pitchFamily="34" charset="0"/>
+                <a:cs typeface="Arial" panose="020B0604020202020204" pitchFamily="34" charset="0"/>
+              </a:rPr>
+              <a:t>filippo.carloni@polimi.it</a:t>
+            </a:r>
+          </a:p>
           <a:p>
             <a:pPr algn="ctr">
               <a:lnSpc>
@@ -15294,17 +15311,22 @@
             <p:ph type="sldNum" sz="quarter" idx="12"/>
           </p:nvPr>
         </p:nvSpPr>
-        <p:spPr/>
+        <p:spPr>
+          <a:xfrm>
+            <a:off x="15773400" y="9639300"/>
+            <a:ext cx="2133600" cy="365125"/>
+          </a:xfrm>
+        </p:spPr>
         <p:txBody>
           <a:bodyPr/>
           <a:lstStyle/>
           <a:p>
             <a:fld id="{B6F15528-21DE-4FAA-801E-634DDDAF4B2B}" type="slidenum">
-              <a:rPr lang="en-US" smtClean="0"/>
+              <a:rPr lang="en-US" sz="2400" smtClean="0"/>
               <a:pPr/>
               <a:t>2</a:t>
             </a:fld>
-            <a:endParaRPr lang="en-US"/>
+            <a:endParaRPr lang="en-US" dirty="0"/>
           </a:p>
         </p:txBody>
       </p:sp>
@@ -23524,68 +23546,6 @@
           </a:p>
         </p:txBody>
       </p:sp>
-      <p:sp>
-        <p:nvSpPr>
-          <p:cNvPr id="2" name="TextBox 8">
-            <a:extLst>
-              <a:ext uri="{FF2B5EF4-FFF2-40B4-BE49-F238E27FC236}">
-                <a16:creationId xmlns:a16="http://schemas.microsoft.com/office/drawing/2014/main" id="{7EE05979-5F4E-062C-837B-F3FA5B15D21F}"/>
-              </a:ext>
-            </a:extLst>
-          </p:cNvPr>
-          <p:cNvSpPr txBox="1"/>
-          <p:nvPr/>
-        </p:nvSpPr>
-        <p:spPr>
-          <a:xfrm>
-            <a:off x="6114089" y="9134379"/>
-            <a:ext cx="6059821" cy="870046"/>
-          </a:xfrm>
-          <a:prstGeom prst="rect">
-            <a:avLst/>
-          </a:prstGeom>
-        </p:spPr>
-        <p:txBody>
-          <a:bodyPr lIns="0" tIns="0" rIns="0" bIns="0" rtlCol="0" anchor="t">
-            <a:spAutoFit/>
-          </a:bodyPr>
-          <a:lstStyle/>
-          <a:p>
-            <a:pPr algn="ctr">
-              <a:lnSpc>
-                <a:spcPts val="3499"/>
-              </a:lnSpc>
-            </a:pPr>
-            <a:r>
-              <a:rPr lang="en-US" sz="2499" spc="124" dirty="0">
-                <a:solidFill>
-                  <a:srgbClr val="2E2E2E"/>
-                </a:solidFill>
-                <a:latin typeface="Arial Black" panose="020B0A04020102020204" pitchFamily="34" charset="0"/>
-                <a:cs typeface="Arial" panose="020B0604020202020204" pitchFamily="34" charset="0"/>
-              </a:rPr>
-              <a:t>marco.labarbera@mail.polimi.it</a:t>
-            </a:r>
-          </a:p>
-          <a:p>
-            <a:pPr algn="ctr">
-              <a:lnSpc>
-                <a:spcPts val="3499"/>
-              </a:lnSpc>
-            </a:pPr>
-            <a:r>
-              <a:rPr lang="en-US" sz="2499" spc="124" dirty="0">
-                <a:solidFill>
-                  <a:srgbClr val="2E2E2E"/>
-                </a:solidFill>
-                <a:latin typeface="Arial Black" panose="020B0A04020102020204" pitchFamily="34" charset="0"/>
-                <a:cs typeface="Arial" panose="020B0604020202020204" pitchFamily="34" charset="0"/>
-              </a:rPr>
-              <a:t>giulio.lotto@mail.polimi.it</a:t>
-            </a:r>
-          </a:p>
-        </p:txBody>
-      </p:sp>
       <p:pic>
         <p:nvPicPr>
           <p:cNvPr id="5" name="Immagine 4">
@@ -23723,6 +23683,85 @@
           </a:p>
         </p:txBody>
       </p:sp>
+      <p:sp>
+        <p:nvSpPr>
+          <p:cNvPr id="6" name="TextBox 8">
+            <a:extLst>
+              <a:ext uri="{FF2B5EF4-FFF2-40B4-BE49-F238E27FC236}">
+                <a16:creationId xmlns:a16="http://schemas.microsoft.com/office/drawing/2014/main" id="{99EAEBEE-EF12-FC2F-4512-162940A1DDA6}"/>
+              </a:ext>
+            </a:extLst>
+          </p:cNvPr>
+          <p:cNvSpPr txBox="1"/>
+          <p:nvPr/>
+        </p:nvSpPr>
+        <p:spPr>
+          <a:xfrm>
+            <a:off x="6129328" y="8910022"/>
+            <a:ext cx="6059821" cy="1318759"/>
+          </a:xfrm>
+          <a:prstGeom prst="rect">
+            <a:avLst/>
+          </a:prstGeom>
+        </p:spPr>
+        <p:txBody>
+          <a:bodyPr lIns="0" tIns="0" rIns="0" bIns="0" rtlCol="0" anchor="t">
+            <a:spAutoFit/>
+          </a:bodyPr>
+          <a:lstStyle/>
+          <a:p>
+            <a:pPr algn="ctr">
+              <a:lnSpc>
+                <a:spcPts val="3499"/>
+              </a:lnSpc>
+            </a:pPr>
+            <a:r>
+              <a:rPr lang="en-US" sz="2499" spc="124" dirty="0">
+                <a:solidFill>
+                  <a:srgbClr val="2E2E2E"/>
+                </a:solidFill>
+                <a:latin typeface="Arial Black" panose="020B0A04020102020204" pitchFamily="34" charset="0"/>
+                <a:cs typeface="Arial" panose="020B0604020202020204" pitchFamily="34" charset="0"/>
+              </a:rPr>
+              <a:t>filippo.carloni@polimi.it</a:t>
+            </a:r>
+          </a:p>
+          <a:p>
+            <a:pPr algn="ctr">
+              <a:lnSpc>
+                <a:spcPts val="3499"/>
+              </a:lnSpc>
+            </a:pPr>
+            <a:r>
+              <a:rPr lang="en-US" sz="2499" spc="124" dirty="0">
+                <a:solidFill>
+                  <a:srgbClr val="2E2E2E"/>
+                </a:solidFill>
+                <a:latin typeface="Arial Black" panose="020B0A04020102020204" pitchFamily="34" charset="0"/>
+                <a:cs typeface="Arial" panose="020B0604020202020204" pitchFamily="34" charset="0"/>
+              </a:rPr>
+              <a:t>marco.labarbera@mail.polimi.it</a:t>
+            </a:r>
+          </a:p>
+          <a:p>
+            <a:pPr algn="ctr">
+              <a:lnSpc>
+                <a:spcPts val="3499"/>
+              </a:lnSpc>
+            </a:pPr>
+            <a:r>
+              <a:rPr lang="en-US" sz="2499" spc="124" dirty="0">
+                <a:solidFill>
+                  <a:srgbClr val="2E2E2E"/>
+                </a:solidFill>
+                <a:latin typeface="Arial Black" panose="020B0A04020102020204" pitchFamily="34" charset="0"/>
+                <a:cs typeface="Arial" panose="020B0604020202020204" pitchFamily="34" charset="0"/>
+              </a:rPr>
+              <a:t>giulio.lotto@mail.polimi.it</a:t>
+            </a:r>
+          </a:p>
+        </p:txBody>
+      </p:sp>
     </p:spTree>
     <p:extLst>
       <p:ext uri="{BB962C8B-B14F-4D97-AF65-F5344CB8AC3E}">
@@ -24605,8 +24644,8 @@
         </p:blipFill>
         <p:spPr>
           <a:xfrm>
-            <a:off x="1752600" y="4772799"/>
-            <a:ext cx="4873257" cy="3941803"/>
+            <a:off x="1676400" y="4583290"/>
+            <a:ext cx="5341838" cy="4320821"/>
           </a:xfrm>
           <a:prstGeom prst="rect">
             <a:avLst/>

</xml_diff>